<commit_message>
new figures for documentation
</commit_message>
<xml_diff>
--- a/documentation/Figures.pptx
+++ b/documentation/Figures.pptx
@@ -212,7 +212,7 @@
           <a:p>
             <a:fld id="{6F0CB9C3-760B-411B-91A2-B4F0AEC3563C}" type="datetimeFigureOut">
               <a:rPr lang="de-DE" smtClean="0"/>
-              <a:t>05.02.2019</a:t>
+              <a:t>06.02.2019</a:t>
             </a:fld>
             <a:endParaRPr lang="de-DE"/>
           </a:p>
@@ -703,7 +703,7 @@
           <a:p>
             <a:fld id="{741DBE4D-3915-4D34-B181-3D444D071C49}" type="datetimeFigureOut">
               <a:rPr lang="de-DE" smtClean="0"/>
-              <a:t>05.02.2019</a:t>
+              <a:t>06.02.2019</a:t>
             </a:fld>
             <a:endParaRPr lang="de-DE"/>
           </a:p>
@@ -873,7 +873,7 @@
           <a:p>
             <a:fld id="{741DBE4D-3915-4D34-B181-3D444D071C49}" type="datetimeFigureOut">
               <a:rPr lang="de-DE" smtClean="0"/>
-              <a:t>05.02.2019</a:t>
+              <a:t>06.02.2019</a:t>
             </a:fld>
             <a:endParaRPr lang="de-DE"/>
           </a:p>
@@ -1053,7 +1053,7 @@
           <a:p>
             <a:fld id="{741DBE4D-3915-4D34-B181-3D444D071C49}" type="datetimeFigureOut">
               <a:rPr lang="de-DE" smtClean="0"/>
-              <a:t>05.02.2019</a:t>
+              <a:t>06.02.2019</a:t>
             </a:fld>
             <a:endParaRPr lang="de-DE"/>
           </a:p>
@@ -1223,7 +1223,7 @@
           <a:p>
             <a:fld id="{741DBE4D-3915-4D34-B181-3D444D071C49}" type="datetimeFigureOut">
               <a:rPr lang="de-DE" smtClean="0"/>
-              <a:t>05.02.2019</a:t>
+              <a:t>06.02.2019</a:t>
             </a:fld>
             <a:endParaRPr lang="de-DE"/>
           </a:p>
@@ -1469,7 +1469,7 @@
           <a:p>
             <a:fld id="{741DBE4D-3915-4D34-B181-3D444D071C49}" type="datetimeFigureOut">
               <a:rPr lang="de-DE" smtClean="0"/>
-              <a:t>05.02.2019</a:t>
+              <a:t>06.02.2019</a:t>
             </a:fld>
             <a:endParaRPr lang="de-DE"/>
           </a:p>
@@ -1701,7 +1701,7 @@
           <a:p>
             <a:fld id="{741DBE4D-3915-4D34-B181-3D444D071C49}" type="datetimeFigureOut">
               <a:rPr lang="de-DE" smtClean="0"/>
-              <a:t>05.02.2019</a:t>
+              <a:t>06.02.2019</a:t>
             </a:fld>
             <a:endParaRPr lang="de-DE"/>
           </a:p>
@@ -2068,7 +2068,7 @@
           <a:p>
             <a:fld id="{741DBE4D-3915-4D34-B181-3D444D071C49}" type="datetimeFigureOut">
               <a:rPr lang="de-DE" smtClean="0"/>
-              <a:t>05.02.2019</a:t>
+              <a:t>06.02.2019</a:t>
             </a:fld>
             <a:endParaRPr lang="de-DE"/>
           </a:p>
@@ -2186,7 +2186,7 @@
           <a:p>
             <a:fld id="{741DBE4D-3915-4D34-B181-3D444D071C49}" type="datetimeFigureOut">
               <a:rPr lang="de-DE" smtClean="0"/>
-              <a:t>05.02.2019</a:t>
+              <a:t>06.02.2019</a:t>
             </a:fld>
             <a:endParaRPr lang="de-DE"/>
           </a:p>
@@ -2281,7 +2281,7 @@
           <a:p>
             <a:fld id="{741DBE4D-3915-4D34-B181-3D444D071C49}" type="datetimeFigureOut">
               <a:rPr lang="de-DE" smtClean="0"/>
-              <a:t>05.02.2019</a:t>
+              <a:t>06.02.2019</a:t>
             </a:fld>
             <a:endParaRPr lang="de-DE"/>
           </a:p>
@@ -2558,7 +2558,7 @@
           <a:p>
             <a:fld id="{741DBE4D-3915-4D34-B181-3D444D071C49}" type="datetimeFigureOut">
               <a:rPr lang="de-DE" smtClean="0"/>
-              <a:t>05.02.2019</a:t>
+              <a:t>06.02.2019</a:t>
             </a:fld>
             <a:endParaRPr lang="de-DE"/>
           </a:p>
@@ -2811,7 +2811,7 @@
           <a:p>
             <a:fld id="{741DBE4D-3915-4D34-B181-3D444D071C49}" type="datetimeFigureOut">
               <a:rPr lang="de-DE" smtClean="0"/>
-              <a:t>05.02.2019</a:t>
+              <a:t>06.02.2019</a:t>
             </a:fld>
             <a:endParaRPr lang="de-DE"/>
           </a:p>
@@ -3024,7 +3024,7 @@
           <a:p>
             <a:fld id="{741DBE4D-3915-4D34-B181-3D444D071C49}" type="datetimeFigureOut">
               <a:rPr lang="de-DE" smtClean="0"/>
-              <a:t>05.02.2019</a:t>
+              <a:t>06.02.2019</a:t>
             </a:fld>
             <a:endParaRPr lang="de-DE"/>
           </a:p>
@@ -9321,11 +9321,7 @@
             </a:r>
             <a:r>
               <a:rPr lang="de-DE" altLang="de-DE" b="0" kern="0" dirty="0" smtClean="0"/>
-              <a:t> </a:t>
-            </a:r>
-            <a:r>
-              <a:rPr lang="de-DE" altLang="de-DE" b="0" kern="0" dirty="0" smtClean="0"/>
-              <a:t>Create </a:t>
+              <a:t> Create </a:t>
             </a:r>
             <a:r>
               <a:rPr lang="de-DE" altLang="de-DE" b="0" kern="0" dirty="0" err="1" smtClean="0"/>
@@ -9363,7 +9359,6 @@
               <a:rPr lang="de-DE" altLang="de-DE" b="0" kern="0" dirty="0" smtClean="0"/>
               <a:t>: XX10</a:t>
             </a:r>
-            <a:endParaRPr lang="de-DE" altLang="de-DE" b="0" kern="0" dirty="0" smtClean="0"/>
           </a:p>
           <a:p>
             <a:pPr>
@@ -9548,14 +9543,6 @@
             </a:r>
             <a:r>
               <a:rPr lang="de-DE" altLang="de-DE" b="0" kern="0" dirty="0" err="1" smtClean="0"/>
-              <a:t>overview</a:t>
-            </a:r>
-            <a:r>
-              <a:rPr lang="de-DE" altLang="de-DE" b="0" kern="0" dirty="0" smtClean="0"/>
-              <a:t> </a:t>
-            </a:r>
-            <a:r>
-              <a:rPr lang="de-DE" altLang="de-DE" b="0" kern="0" dirty="0" err="1" smtClean="0"/>
               <a:t>table</a:t>
             </a:r>
             <a:r>
@@ -9626,7 +9613,7 @@
         </p:nvSpPr>
         <p:spPr bwMode="auto">
           <a:xfrm>
-            <a:off x="5174827" y="3580598"/>
+            <a:off x="5028523" y="3598886"/>
             <a:ext cx="3721523" cy="1511166"/>
           </a:xfrm>
           <a:prstGeom prst="rect">
@@ -9744,15 +9731,7 @@
             </a:r>
             <a:r>
               <a:rPr lang="de-DE" altLang="de-DE" sz="1400" kern="0" dirty="0" smtClean="0"/>
-              <a:t> „</a:t>
-            </a:r>
-            <a:r>
-              <a:rPr lang="de-DE" altLang="de-DE" sz="1400" kern="0" dirty="0" smtClean="0"/>
-              <a:t>C</a:t>
-            </a:r>
-            <a:r>
-              <a:rPr lang="de-DE" altLang="de-DE" sz="1400" kern="0" dirty="0" smtClean="0"/>
-              <a:t>ustomer“ </a:t>
+              <a:t> „Customer“ </a:t>
             </a:r>
             <a:r>
               <a:rPr lang="de-DE" altLang="de-DE" sz="1400" kern="0" dirty="0" err="1" smtClean="0"/>
@@ -9779,11 +9758,7 @@
             </a:pPr>
             <a:r>
               <a:rPr lang="de-DE" altLang="de-DE" sz="1400" kern="0" dirty="0" smtClean="0"/>
-              <a:t>C</a:t>
-            </a:r>
-            <a:r>
-              <a:rPr lang="de-DE" altLang="de-DE" sz="1400" kern="0" dirty="0" smtClean="0"/>
-              <a:t>lick </a:t>
+              <a:t>Click </a:t>
             </a:r>
             <a:r>
               <a:rPr lang="de-DE" altLang="de-DE" sz="1400" kern="0" dirty="0" err="1"/>
@@ -9805,7 +9780,6 @@
               <a:rPr lang="de-DE" altLang="de-DE" sz="1400" kern="0" dirty="0" smtClean="0"/>
               <a:t>New“</a:t>
             </a:r>
-            <a:endParaRPr lang="de-DE" altLang="de-DE" sz="1400" kern="0" dirty="0" smtClean="0"/>
           </a:p>
           <a:p>
             <a:pPr>
@@ -9952,85 +9926,8 @@
         </p:nvSpPr>
         <p:spPr bwMode="auto">
           <a:xfrm rot="16200000">
-            <a:off x="2776911" y="3190753"/>
-            <a:ext cx="382742" cy="4338772"/>
-          </a:xfrm>
-          <a:prstGeom prst="leftBrace">
-            <a:avLst/>
-          </a:prstGeom>
-          <a:solidFill>
-            <a:schemeClr val="bg1"/>
-          </a:solidFill>
-          <a:ln w="6350" cap="flat" cmpd="sng" algn="ctr">
-            <a:solidFill>
-              <a:schemeClr val="tx1"/>
-            </a:solidFill>
-            <a:prstDash val="solid"/>
-            <a:round/>
-            <a:headEnd type="none" w="med" len="med"/>
-            <a:tailEnd type="none" w="med" len="med"/>
-          </a:ln>
-          <a:effectLst/>
-          <a:extLst>
-            <a:ext uri="{AF507438-7753-43E0-B8FC-AC1667EBCBE1}">
-              <a14:hiddenEffects xmlns:a14="http://schemas.microsoft.com/office/drawing/2010/main">
-                <a:effectLst>
-                  <a:outerShdw dist="35921" dir="2700000" algn="ctr" rotWithShape="0">
-                    <a:schemeClr val="bg2"/>
-                  </a:outerShdw>
-                </a:effectLst>
-              </a14:hiddenEffects>
-            </a:ext>
-          </a:extLst>
-        </p:spPr>
-        <p:txBody>
-          <a:bodyPr vert="horz" wrap="none" lIns="0" tIns="0" rIns="0" bIns="0" numCol="1" rtlCol="0" anchor="ctr" anchorCtr="0" compatLnSpc="1">
-            <a:prstTxWarp prst="textNoShape">
-              <a:avLst/>
-            </a:prstTxWarp>
-          </a:bodyPr>
-          <a:lstStyle/>
-          <a:p>
-            <a:pPr marL="0" marR="0" indent="0" algn="l" defTabSz="914400" rtl="0" eaLnBrk="1" fontAlgn="base" latinLnBrk="0" hangingPunct="1">
-              <a:lnSpc>
-                <a:spcPct val="100000"/>
-              </a:lnSpc>
-              <a:spcBef>
-                <a:spcPct val="0"/>
-              </a:spcBef>
-              <a:spcAft>
-                <a:spcPct val="0"/>
-              </a:spcAft>
-              <a:buClrTx/>
-              <a:buSzTx/>
-              <a:buFontTx/>
-              <a:buNone/>
-              <a:tabLst/>
-            </a:pPr>
-            <a:endParaRPr kumimoji="0" lang="de-DE" sz="1400" b="0" i="0" u="none" strike="noStrike" cap="none" normalizeH="0" baseline="0" smtClean="0">
-              <a:ln>
-                <a:noFill/>
-              </a:ln>
-              <a:solidFill>
-                <a:schemeClr val="tx1"/>
-              </a:solidFill>
-              <a:effectLst/>
-              <a:latin typeface="Arial" charset="0"/>
-              <a:cs typeface="Arial" charset="0"/>
-            </a:endParaRPr>
-          </a:p>
-        </p:txBody>
-      </p:sp>
-      <p:sp>
-        <p:nvSpPr>
-          <p:cNvPr id="7" name="Geschweifte Klammer links 6"/>
-          <p:cNvSpPr/>
-          <p:nvPr/>
-        </p:nvSpPr>
-        <p:spPr bwMode="auto">
-          <a:xfrm rot="16200000">
-            <a:off x="6833666" y="3509932"/>
-            <a:ext cx="403848" cy="3721521"/>
+            <a:off x="2238045" y="3729619"/>
+            <a:ext cx="382742" cy="3261040"/>
           </a:xfrm>
           <a:prstGeom prst="leftBrace">
             <a:avLst/>
@@ -10106,7 +10003,7 @@
         </p:nvCxnSpPr>
         <p:spPr bwMode="auto">
           <a:xfrm flipV="1">
-            <a:off x="2612005" y="4109987"/>
+            <a:off x="2465701" y="4128275"/>
             <a:ext cx="2562823" cy="3"/>
           </a:xfrm>
           <a:prstGeom prst="straightConnector1">
@@ -10146,8 +10043,8 @@
         </p:nvSpPr>
         <p:spPr>
           <a:xfrm>
-            <a:off x="1424538" y="5555776"/>
-            <a:ext cx="2800952" cy="523220"/>
+            <a:off x="1031346" y="5555776"/>
+            <a:ext cx="2800952" cy="646331"/>
           </a:xfrm>
           <a:prstGeom prst="rect">
             <a:avLst/>
@@ -10161,26 +10058,6 @@
           <a:lstStyle/>
           <a:p>
             <a:pPr algn="ctr"/>
-            <a:r>
-              <a:rPr lang="de-DE" b="1" dirty="0" err="1" smtClean="0">
-                <a:solidFill>
-                  <a:schemeClr val="accent1">
-                    <a:lumMod val="75000"/>
-                  </a:schemeClr>
-                </a:solidFill>
-              </a:rPr>
-              <a:t>Declarative</a:t>
-            </a:r>
-            <a:r>
-              <a:rPr lang="de-DE" b="1" dirty="0" smtClean="0">
-                <a:solidFill>
-                  <a:schemeClr val="accent1">
-                    <a:lumMod val="75000"/>
-                  </a:schemeClr>
-                </a:solidFill>
-              </a:rPr>
-              <a:t> </a:t>
-            </a:r>
             <a:r>
               <a:rPr lang="de-DE" b="1" dirty="0" smtClean="0">
                 <a:solidFill>
@@ -10249,7 +10126,7 @@
         </p:nvSpPr>
         <p:spPr>
           <a:xfrm>
-            <a:off x="5648780" y="5555776"/>
+            <a:off x="5493332" y="5555776"/>
             <a:ext cx="2800952" cy="646331"/>
           </a:xfrm>
           <a:prstGeom prst="rect">
@@ -10272,7 +10149,7 @@
                   </a:schemeClr>
                 </a:solidFill>
               </a:rPr>
-              <a:t>Imperative Low-Level </a:t>
+              <a:t>Low-Level </a:t>
             </a:r>
             <a:endParaRPr lang="de-DE" b="1" dirty="0" smtClean="0">
               <a:solidFill>
@@ -10342,7 +10219,7 @@
         </p:nvSpPr>
         <p:spPr bwMode="auto">
           <a:xfrm>
-            <a:off x="5174827" y="2676524"/>
+            <a:off x="5028523" y="2694812"/>
             <a:ext cx="3721523" cy="749139"/>
           </a:xfrm>
           <a:prstGeom prst="rect">
@@ -10492,11 +10369,7 @@
             </a:pPr>
             <a:r>
               <a:rPr lang="de-DE" altLang="de-DE" sz="1400" kern="0" dirty="0" smtClean="0"/>
-              <a:t>C</a:t>
-            </a:r>
-            <a:r>
-              <a:rPr lang="de-DE" altLang="de-DE" sz="1400" kern="0" dirty="0" smtClean="0"/>
-              <a:t>lick </a:t>
+              <a:t>Click </a:t>
             </a:r>
             <a:r>
               <a:rPr lang="de-DE" altLang="de-DE" sz="1400" kern="0" dirty="0" err="1" smtClean="0"/>
@@ -10518,7 +10391,7 @@
         </p:nvCxnSpPr>
         <p:spPr bwMode="auto">
           <a:xfrm>
-            <a:off x="3746182" y="3267805"/>
+            <a:off x="3599878" y="3286093"/>
             <a:ext cx="1428646" cy="2924"/>
           </a:xfrm>
           <a:prstGeom prst="straightConnector1">
@@ -10550,6 +10423,83 @@
           </a:extLst>
         </p:spPr>
       </p:cxnSp>
+      <p:sp>
+        <p:nvSpPr>
+          <p:cNvPr id="13" name="Geschweifte Klammer links 12"/>
+          <p:cNvSpPr/>
+          <p:nvPr/>
+        </p:nvSpPr>
+        <p:spPr bwMode="auto">
+          <a:xfrm rot="16200000">
+            <a:off x="6678219" y="3509932"/>
+            <a:ext cx="403848" cy="3721521"/>
+          </a:xfrm>
+          <a:prstGeom prst="leftBrace">
+            <a:avLst/>
+          </a:prstGeom>
+          <a:solidFill>
+            <a:schemeClr val="bg1"/>
+          </a:solidFill>
+          <a:ln w="6350" cap="flat" cmpd="sng" algn="ctr">
+            <a:solidFill>
+              <a:schemeClr val="tx1"/>
+            </a:solidFill>
+            <a:prstDash val="solid"/>
+            <a:round/>
+            <a:headEnd type="none" w="med" len="med"/>
+            <a:tailEnd type="none" w="med" len="med"/>
+          </a:ln>
+          <a:effectLst/>
+          <a:extLst>
+            <a:ext uri="{AF507438-7753-43E0-B8FC-AC1667EBCBE1}">
+              <a14:hiddenEffects xmlns:a14="http://schemas.microsoft.com/office/drawing/2010/main">
+                <a:effectLst>
+                  <a:outerShdw dist="35921" dir="2700000" algn="ctr" rotWithShape="0">
+                    <a:schemeClr val="bg2"/>
+                  </a:outerShdw>
+                </a:effectLst>
+              </a14:hiddenEffects>
+            </a:ext>
+          </a:extLst>
+        </p:spPr>
+        <p:txBody>
+          <a:bodyPr vert="horz" wrap="none" lIns="0" tIns="0" rIns="0" bIns="0" numCol="1" rtlCol="0" anchor="ctr" anchorCtr="0" compatLnSpc="1">
+            <a:prstTxWarp prst="textNoShape">
+              <a:avLst/>
+            </a:prstTxWarp>
+          </a:bodyPr>
+          <a:lstStyle/>
+          <a:p>
+            <a:pPr marL="0" marR="0" indent="0" algn="l" defTabSz="914400" rtl="0" eaLnBrk="1" fontAlgn="base" latinLnBrk="0" hangingPunct="1">
+              <a:lnSpc>
+                <a:spcPct val="100000"/>
+              </a:lnSpc>
+              <a:spcBef>
+                <a:spcPct val="0"/>
+              </a:spcBef>
+              <a:spcAft>
+                <a:spcPct val="0"/>
+              </a:spcAft>
+              <a:buClrTx/>
+              <a:buSzTx/>
+              <a:buFontTx/>
+              <a:buNone/>
+              <a:tabLst/>
+            </a:pPr>
+            <a:endParaRPr kumimoji="0" lang="de-DE" sz="1400" b="0" i="0" u="none" strike="noStrike" cap="none" normalizeH="0" baseline="0" smtClean="0">
+              <a:ln>
+                <a:noFill/>
+              </a:ln>
+              <a:solidFill>
+                <a:schemeClr val="tx1"/>
+              </a:solidFill>
+              <a:effectLst/>
+              <a:latin typeface="Arial" charset="0"/>
+              <a:cs typeface="Arial" charset="0"/>
+            </a:endParaRPr>
+          </a:p>
+        </p:txBody>
+      </p:sp>
     </p:spTree>
     <p:extLst>
       <p:ext uri="{BB962C8B-B14F-4D97-AF65-F5344CB8AC3E}">
@@ -10587,46 +10537,6 @@
           <a:chExt cx="0" cy="0"/>
         </a:xfrm>
       </p:grpSpPr>
-      <p:cxnSp>
-        <p:nvCxnSpPr>
-          <p:cNvPr id="7" name="Gerade Verbindung mit Pfeil 6"/>
-          <p:cNvCxnSpPr/>
-          <p:nvPr/>
-        </p:nvCxnSpPr>
-        <p:spPr bwMode="auto">
-          <a:xfrm flipH="1">
-            <a:off x="6050440" y="2715768"/>
-            <a:ext cx="1484216" cy="963"/>
-          </a:xfrm>
-          <a:prstGeom prst="straightConnector1">
-            <a:avLst/>
-          </a:prstGeom>
-          <a:solidFill>
-            <a:schemeClr val="bg1"/>
-          </a:solidFill>
-          <a:ln w="76200" cap="flat" cmpd="sng" algn="ctr">
-            <a:solidFill>
-              <a:srgbClr val="FFC000"/>
-            </a:solidFill>
-            <a:prstDash val="solid"/>
-            <a:round/>
-            <a:headEnd type="none" w="med" len="med"/>
-            <a:tailEnd type="none" w="med" len="med"/>
-          </a:ln>
-          <a:effectLst/>
-          <a:extLst>
-            <a:ext uri="{AF507438-7753-43E0-B8FC-AC1667EBCBE1}">
-              <a14:hiddenEffects xmlns:a14="http://schemas.microsoft.com/office/drawing/2010/main">
-                <a:effectLst>
-                  <a:outerShdw dist="35921" dir="2700000" algn="ctr" rotWithShape="0">
-                    <a:schemeClr val="bg2"/>
-                  </a:outerShdw>
-                </a:effectLst>
-              </a14:hiddenEffects>
-            </a:ext>
-          </a:extLst>
-        </p:spPr>
-      </p:cxnSp>
       <p:sp>
         <p:nvSpPr>
           <p:cNvPr id="5" name="Rectangle 3"/>
@@ -10885,11 +10795,7 @@
             </a:r>
             <a:r>
               <a:rPr lang="de-DE" altLang="de-DE" b="0" kern="0" dirty="0" smtClean="0"/>
-              <a:t> </a:t>
-            </a:r>
-            <a:r>
-              <a:rPr lang="de-DE" altLang="de-DE" b="0" kern="0" dirty="0" smtClean="0"/>
-              <a:t>Create </a:t>
+              <a:t> Create </a:t>
             </a:r>
             <a:r>
               <a:rPr lang="de-DE" altLang="de-DE" b="0" kern="0" dirty="0" err="1" smtClean="0"/>
@@ -10903,14 +10809,6 @@
               <a:rPr lang="de-DE" altLang="de-DE" b="0" kern="0" dirty="0" err="1" smtClean="0"/>
               <a:t>order</a:t>
             </a:r>
-            <a:endParaRPr lang="de-DE" altLang="de-DE" b="0" kern="0" dirty="0" smtClean="0"/>
-          </a:p>
-          <a:p>
-            <a:pPr>
-              <a:lnSpc>
-                <a:spcPts val="800"/>
-              </a:lnSpc>
-            </a:pPr>
             <a:endParaRPr lang="de-DE" altLang="de-DE" kern="0" dirty="0" smtClean="0"/>
           </a:p>
           <a:p>
@@ -10925,11 +10823,7 @@
             </a:r>
             <a:r>
               <a:rPr lang="de-DE" altLang="de-DE" b="0" kern="0" dirty="0" smtClean="0"/>
-              <a:t> </a:t>
-            </a:r>
-            <a:r>
-              <a:rPr lang="de-DE" altLang="de-DE" b="0" kern="0" dirty="0" smtClean="0"/>
-              <a:t>The </a:t>
+              <a:t> The </a:t>
             </a:r>
             <a:r>
               <a:rPr lang="de-DE" altLang="de-DE" b="0" kern="0" dirty="0" err="1" smtClean="0"/>
@@ -10971,14 +10865,6 @@
               <a:rPr lang="de-DE" altLang="de-DE" b="0" kern="0" dirty="0" smtClean="0"/>
               <a:t>.</a:t>
             </a:r>
-            <a:endParaRPr lang="de-DE" altLang="de-DE" b="0" kern="0" dirty="0" smtClean="0"/>
-          </a:p>
-          <a:p>
-            <a:pPr>
-              <a:lnSpc>
-                <a:spcPts val="800"/>
-              </a:lnSpc>
-            </a:pPr>
             <a:endParaRPr lang="de-DE" altLang="de-DE" kern="0" dirty="0" smtClean="0"/>
           </a:p>
           <a:p>
@@ -11001,19 +10887,7 @@
             </a:r>
             <a:r>
               <a:rPr lang="de-DE" altLang="de-DE" b="0" kern="0" dirty="0" smtClean="0"/>
-              <a:t> </a:t>
-            </a:r>
-            <a:r>
-              <a:rPr lang="de-DE" altLang="de-DE" b="0" kern="0" dirty="0" smtClean="0"/>
-              <a:t>„</a:t>
-            </a:r>
-            <a:r>
-              <a:rPr lang="de-DE" altLang="de-DE" b="0" kern="0" dirty="0" smtClean="0"/>
-              <a:t>Miller</a:t>
-            </a:r>
-            <a:r>
-              <a:rPr lang="de-DE" altLang="de-DE" b="0" kern="0" dirty="0" smtClean="0"/>
-              <a:t>“ </a:t>
+              <a:t> „Miller“ </a:t>
             </a:r>
             <a:r>
               <a:rPr lang="de-DE" altLang="de-DE" b="0" kern="0" dirty="0" err="1" smtClean="0"/>
@@ -11049,11 +10923,7 @@
             </a:r>
             <a:r>
               <a:rPr lang="de-DE" altLang="de-DE" b="0" kern="0" dirty="0" smtClean="0"/>
-              <a:t> </a:t>
-            </a:r>
-            <a:r>
-              <a:rPr lang="de-DE" altLang="de-DE" b="0" kern="0" dirty="0" smtClean="0"/>
-              <a:t>a </a:t>
+              <a:t> a </a:t>
             </a:r>
             <a:r>
               <a:rPr lang="de-DE" altLang="de-DE" b="0" kern="0" dirty="0" err="1" smtClean="0"/>
@@ -11123,14 +10993,6 @@
               <a:rPr lang="de-DE" altLang="de-DE" b="0" kern="0" dirty="0" err="1" smtClean="0"/>
               <a:t>customer</a:t>
             </a:r>
-            <a:endParaRPr lang="de-DE" altLang="de-DE" b="0" kern="0" dirty="0" smtClean="0"/>
-          </a:p>
-          <a:p>
-            <a:pPr>
-              <a:lnSpc>
-                <a:spcPts val="800"/>
-              </a:lnSpc>
-            </a:pPr>
             <a:endParaRPr lang="de-DE" altLang="de-DE" b="0" kern="0" dirty="0"/>
           </a:p>
           <a:p>
@@ -11164,10 +11026,6 @@
               <a:t> </a:t>
             </a:r>
             <a:r>
-              <a:rPr lang="de-DE" altLang="de-DE" b="0" kern="0" dirty="0" err="1" smtClean="0"/>
-              <a:t>overview</a:t>
-            </a:r>
-            <a:r>
               <a:rPr lang="de-DE" altLang="de-DE" b="0" kern="0" dirty="0" smtClean="0"/>
               <a:t> </a:t>
             </a:r>
@@ -11235,7 +11093,6 @@
               <a:rPr lang="de-DE" altLang="de-DE" b="0" kern="0" dirty="0" smtClean="0"/>
               <a:t>.</a:t>
             </a:r>
-            <a:endParaRPr lang="de-DE" altLang="de-DE" b="0" kern="0" dirty="0" smtClean="0"/>
           </a:p>
           <a:p>
             <a:pPr>
@@ -11269,9 +11126,9 @@
           <p:nvPr/>
         </p:nvCxnSpPr>
         <p:spPr bwMode="auto">
-          <a:xfrm>
-            <a:off x="7498080" y="2715768"/>
-            <a:ext cx="16362" cy="937021"/>
+          <a:xfrm flipV="1">
+            <a:off x="6023008" y="2121408"/>
+            <a:ext cx="664626" cy="9144"/>
           </a:xfrm>
           <a:prstGeom prst="straightConnector1">
             <a:avLst/>
@@ -11310,8 +11167,8 @@
         </p:nvSpPr>
         <p:spPr bwMode="auto">
           <a:xfrm>
-            <a:off x="3724978" y="3652789"/>
-            <a:ext cx="4173512" cy="1193531"/>
+            <a:off x="6715066" y="1819657"/>
+            <a:ext cx="2566094" cy="813815"/>
           </a:xfrm>
           <a:prstGeom prst="rect">
             <a:avLst/>
@@ -11334,7 +11191,189 @@
           <a:extLst/>
         </p:spPr>
         <p:txBody>
-          <a:bodyPr vert="horz" wrap="none" lIns="0" tIns="0" rIns="0" bIns="0" numCol="1" rtlCol="0" anchor="ctr" anchorCtr="0" compatLnSpc="1">
+          <a:bodyPr vert="horz" wrap="none" lIns="36000" tIns="72000" rIns="0" bIns="0" numCol="1" rtlCol="0" anchor="t" anchorCtr="0" compatLnSpc="1">
+            <a:prstTxWarp prst="textNoShape">
+              <a:avLst/>
+            </a:prstTxWarp>
+          </a:bodyPr>
+          <a:lstStyle/>
+          <a:p>
+            <a:pPr>
+              <a:lnSpc>
+                <a:spcPts val="800"/>
+              </a:lnSpc>
+            </a:pPr>
+            <a:r>
+              <a:rPr lang="de-DE" altLang="de-DE" sz="1200" kern="0" dirty="0" smtClean="0"/>
+              <a:t>Click </a:t>
+            </a:r>
+            <a:r>
+              <a:rPr lang="de-DE" altLang="de-DE" sz="1200" kern="0" dirty="0" err="1"/>
+              <a:t>b</a:t>
+            </a:r>
+            <a:r>
+              <a:rPr lang="de-DE" altLang="de-DE" sz="1200" kern="0" dirty="0" err="1" smtClean="0"/>
+              <a:t>utton</a:t>
+            </a:r>
+            <a:r>
+              <a:rPr lang="de-DE" altLang="de-DE" sz="1200" kern="0" dirty="0" smtClean="0"/>
+              <a:t> </a:t>
+            </a:r>
+            <a:r>
+              <a:rPr lang="de-DE" altLang="de-DE" sz="1200" kern="0" dirty="0"/>
+              <a:t>“</a:t>
+            </a:r>
+            <a:r>
+              <a:rPr lang="de-DE" altLang="de-DE" sz="1200" kern="0" dirty="0" smtClean="0"/>
+              <a:t>New“</a:t>
+            </a:r>
+          </a:p>
+          <a:p>
+            <a:pPr>
+              <a:lnSpc>
+                <a:spcPts val="800"/>
+              </a:lnSpc>
+            </a:pPr>
+            <a:r>
+              <a:rPr lang="de-DE" altLang="de-DE" sz="1200" kern="0" dirty="0" smtClean="0"/>
+              <a:t>.</a:t>
+            </a:r>
+            <a:endParaRPr lang="de-DE" altLang="de-DE" sz="1200" kern="0" dirty="0"/>
+          </a:p>
+          <a:p>
+            <a:pPr>
+              <a:lnSpc>
+                <a:spcPts val="800"/>
+              </a:lnSpc>
+            </a:pPr>
+            <a:r>
+              <a:rPr lang="de-DE" altLang="de-DE" sz="1200" kern="0" dirty="0" smtClean="0"/>
+              <a:t>Select in </a:t>
+            </a:r>
+            <a:r>
+              <a:rPr lang="de-DE" altLang="de-DE" sz="1200" kern="0" dirty="0" err="1" smtClean="0"/>
+              <a:t>field</a:t>
+            </a:r>
+            <a:r>
+              <a:rPr lang="de-DE" altLang="de-DE" sz="1200" kern="0" dirty="0" smtClean="0"/>
+              <a:t> “Type“ </a:t>
+            </a:r>
+            <a:r>
+              <a:rPr lang="de-DE" altLang="de-DE" sz="1200" kern="0" dirty="0" err="1" smtClean="0"/>
+              <a:t>value</a:t>
+            </a:r>
+            <a:r>
+              <a:rPr lang="de-DE" altLang="de-DE" sz="1200" kern="0" dirty="0" smtClean="0"/>
+              <a:t> “Standard“.</a:t>
+            </a:r>
+            <a:endParaRPr lang="de-DE" altLang="de-DE" sz="1200" kern="0" dirty="0"/>
+          </a:p>
+          <a:p>
+            <a:pPr>
+              <a:lnSpc>
+                <a:spcPts val="800"/>
+              </a:lnSpc>
+            </a:pPr>
+            <a:endParaRPr lang="de-DE" altLang="de-DE" sz="1200" kern="0" dirty="0" smtClean="0"/>
+          </a:p>
+          <a:p>
+            <a:pPr>
+              <a:lnSpc>
+                <a:spcPts val="800"/>
+              </a:lnSpc>
+            </a:pPr>
+            <a:r>
+              <a:rPr lang="de-DE" altLang="de-DE" sz="1200" kern="0" dirty="0" smtClean="0"/>
+              <a:t>…</a:t>
+            </a:r>
+            <a:endParaRPr lang="de-DE" altLang="de-DE" sz="1200" kern="0" dirty="0"/>
+          </a:p>
+          <a:p>
+            <a:pPr>
+              <a:lnSpc>
+                <a:spcPts val="800"/>
+              </a:lnSpc>
+            </a:pPr>
+            <a:endParaRPr lang="de-DE" altLang="de-DE" sz="1200" kern="0" dirty="0"/>
+          </a:p>
+          <a:p>
+            <a:pPr>
+              <a:lnSpc>
+                <a:spcPts val="800"/>
+              </a:lnSpc>
+            </a:pPr>
+            <a:r>
+              <a:rPr lang="de-DE" altLang="de-DE" sz="1200" kern="0" dirty="0" smtClean="0"/>
+              <a:t>Click </a:t>
+            </a:r>
+            <a:r>
+              <a:rPr lang="de-DE" altLang="de-DE" sz="1200" kern="0" dirty="0" err="1"/>
+              <a:t>b</a:t>
+            </a:r>
+            <a:r>
+              <a:rPr lang="de-DE" altLang="de-DE" sz="1200" kern="0" dirty="0" err="1" smtClean="0"/>
+              <a:t>utton</a:t>
+            </a:r>
+            <a:r>
+              <a:rPr lang="de-DE" altLang="de-DE" sz="1200" kern="0" dirty="0" smtClean="0"/>
+              <a:t> </a:t>
+            </a:r>
+            <a:r>
+              <a:rPr lang="de-DE" altLang="de-DE" sz="1200" kern="0" dirty="0"/>
+              <a:t>“OK“.</a:t>
+            </a:r>
+          </a:p>
+          <a:p>
+            <a:pPr>
+              <a:lnSpc>
+                <a:spcPts val="800"/>
+              </a:lnSpc>
+            </a:pPr>
+            <a:endParaRPr lang="de-DE" altLang="de-DE" sz="1200" kern="0" dirty="0"/>
+          </a:p>
+          <a:p>
+            <a:pPr>
+              <a:lnSpc>
+                <a:spcPts val="800"/>
+              </a:lnSpc>
+            </a:pPr>
+            <a:endParaRPr lang="de-DE" altLang="de-DE" sz="1200" kern="0" dirty="0"/>
+          </a:p>
+        </p:txBody>
+      </p:sp>
+      <p:sp>
+        <p:nvSpPr>
+          <p:cNvPr id="8" name="Rechteck 7"/>
+          <p:cNvSpPr/>
+          <p:nvPr/>
+        </p:nvSpPr>
+        <p:spPr bwMode="auto">
+          <a:xfrm>
+            <a:off x="5107648" y="1537478"/>
+            <a:ext cx="4173512" cy="282179"/>
+          </a:xfrm>
+          <a:prstGeom prst="rect">
+            <a:avLst/>
+          </a:prstGeom>
+          <a:solidFill>
+            <a:schemeClr val="bg1">
+              <a:lumMod val="85000"/>
+            </a:schemeClr>
+          </a:solidFill>
+          <a:ln w="6350" cap="flat" cmpd="sng" algn="ctr">
+            <a:solidFill>
+              <a:schemeClr val="tx1"/>
+            </a:solidFill>
+            <a:prstDash val="solid"/>
+            <a:round/>
+            <a:headEnd type="none" w="med" len="med"/>
+            <a:tailEnd type="none" w="med" len="med"/>
+          </a:ln>
+          <a:effectLst/>
+          <a:extLst/>
+        </p:spPr>
+        <p:txBody>
+          <a:bodyPr vert="horz" wrap="none" lIns="36000" tIns="0" rIns="0" bIns="0" numCol="1" rtlCol="0" anchor="t" anchorCtr="0" compatLnSpc="1">
             <a:prstTxWarp prst="textNoShape">
               <a:avLst/>
             </a:prstTxWarp>
@@ -11354,22 +11393,6 @@
                 <a:spcPts val="800"/>
               </a:lnSpc>
             </a:pPr>
-            <a:endParaRPr lang="de-DE" altLang="de-DE" sz="1200" kern="0" dirty="0" smtClean="0"/>
-          </a:p>
-          <a:p>
-            <a:pPr>
-              <a:lnSpc>
-                <a:spcPts val="800"/>
-              </a:lnSpc>
-            </a:pPr>
-            <a:endParaRPr lang="de-DE" altLang="de-DE" sz="1200" kern="0" dirty="0"/>
-          </a:p>
-          <a:p>
-            <a:pPr>
-              <a:lnSpc>
-                <a:spcPts val="800"/>
-              </a:lnSpc>
-            </a:pPr>
             <a:r>
               <a:rPr lang="de-DE" altLang="de-DE" sz="1200" b="1" kern="0" dirty="0" smtClean="0"/>
               <a:t>Script</a:t>
@@ -11447,177 +11470,10 @@
               <a:t> </a:t>
             </a:r>
             <a:r>
-              <a:rPr lang="de-DE" altLang="de-DE" sz="1200" kern="0" dirty="0" err="1"/>
+              <a:rPr lang="de-DE" altLang="de-DE" sz="1200" kern="0" dirty="0" err="1" smtClean="0"/>
               <a:t>customer</a:t>
             </a:r>
             <a:endParaRPr lang="de-DE" altLang="de-DE" sz="1200" b="1" i="1" kern="0" dirty="0"/>
-          </a:p>
-          <a:p>
-            <a:pPr>
-              <a:lnSpc>
-                <a:spcPts val="800"/>
-              </a:lnSpc>
-            </a:pPr>
-            <a:endParaRPr lang="de-DE" altLang="de-DE" sz="1200" kern="0" dirty="0" smtClean="0"/>
-          </a:p>
-          <a:p>
-            <a:pPr>
-              <a:lnSpc>
-                <a:spcPts val="800"/>
-              </a:lnSpc>
-            </a:pPr>
-            <a:endParaRPr lang="de-DE" altLang="de-DE" sz="1200" kern="0" dirty="0"/>
-          </a:p>
-          <a:p>
-            <a:pPr>
-              <a:lnSpc>
-                <a:spcPts val="800"/>
-              </a:lnSpc>
-            </a:pPr>
-            <a:r>
-              <a:rPr lang="de-DE" altLang="de-DE" sz="1200" kern="0" dirty="0"/>
-              <a:t>C</a:t>
-            </a:r>
-            <a:r>
-              <a:rPr lang="de-DE" altLang="de-DE" sz="1200" kern="0" dirty="0" smtClean="0"/>
-              <a:t>lick </a:t>
-            </a:r>
-            <a:r>
-              <a:rPr lang="de-DE" altLang="de-DE" sz="1200" kern="0" dirty="0" err="1"/>
-              <a:t>b</a:t>
-            </a:r>
-            <a:r>
-              <a:rPr lang="de-DE" altLang="de-DE" sz="1200" kern="0" dirty="0" err="1" smtClean="0"/>
-              <a:t>utton</a:t>
-            </a:r>
-            <a:r>
-              <a:rPr lang="de-DE" altLang="de-DE" sz="1200" kern="0" dirty="0" smtClean="0"/>
-              <a:t> </a:t>
-            </a:r>
-            <a:r>
-              <a:rPr lang="de-DE" altLang="de-DE" sz="1200" kern="0" dirty="0"/>
-              <a:t>“</a:t>
-            </a:r>
-            <a:r>
-              <a:rPr lang="de-DE" altLang="de-DE" sz="1200" kern="0" dirty="0" smtClean="0"/>
-              <a:t>New“</a:t>
-            </a:r>
-            <a:endParaRPr lang="de-DE" altLang="de-DE" sz="1200" kern="0" dirty="0" smtClean="0"/>
-          </a:p>
-          <a:p>
-            <a:pPr>
-              <a:lnSpc>
-                <a:spcPts val="800"/>
-              </a:lnSpc>
-            </a:pPr>
-            <a:r>
-              <a:rPr lang="de-DE" altLang="de-DE" sz="1200" kern="0" dirty="0" smtClean="0"/>
-              <a:t>.</a:t>
-            </a:r>
-            <a:endParaRPr lang="de-DE" altLang="de-DE" sz="1200" kern="0" dirty="0"/>
-          </a:p>
-          <a:p>
-            <a:pPr>
-              <a:lnSpc>
-                <a:spcPts val="800"/>
-              </a:lnSpc>
-            </a:pPr>
-            <a:r>
-              <a:rPr lang="de-DE" altLang="de-DE" sz="1200" kern="0" dirty="0" smtClean="0"/>
-              <a:t>Select in </a:t>
-            </a:r>
-            <a:r>
-              <a:rPr lang="de-DE" altLang="de-DE" sz="1200" kern="0" dirty="0" err="1" smtClean="0"/>
-              <a:t>field</a:t>
-            </a:r>
-            <a:r>
-              <a:rPr lang="de-DE" altLang="de-DE" sz="1200" kern="0" dirty="0" smtClean="0"/>
-              <a:t> “Type“ </a:t>
-            </a:r>
-            <a:r>
-              <a:rPr lang="de-DE" altLang="de-DE" sz="1200" kern="0" dirty="0" err="1" smtClean="0"/>
-              <a:t>value</a:t>
-            </a:r>
-            <a:r>
-              <a:rPr lang="de-DE" altLang="de-DE" sz="1200" kern="0" dirty="0" smtClean="0"/>
-              <a:t> “Standard“.</a:t>
-            </a:r>
-            <a:endParaRPr lang="de-DE" altLang="de-DE" sz="1200" kern="0" dirty="0"/>
-          </a:p>
-          <a:p>
-            <a:pPr>
-              <a:lnSpc>
-                <a:spcPts val="800"/>
-              </a:lnSpc>
-            </a:pPr>
-            <a:endParaRPr lang="de-DE" altLang="de-DE" sz="1200" kern="0" dirty="0" smtClean="0"/>
-          </a:p>
-          <a:p>
-            <a:pPr>
-              <a:lnSpc>
-                <a:spcPts val="800"/>
-              </a:lnSpc>
-            </a:pPr>
-            <a:r>
-              <a:rPr lang="de-DE" altLang="de-DE" sz="1200" kern="0" dirty="0" smtClean="0"/>
-              <a:t>…</a:t>
-            </a:r>
-            <a:endParaRPr lang="de-DE" altLang="de-DE" sz="1200" kern="0" dirty="0"/>
-          </a:p>
-          <a:p>
-            <a:pPr>
-              <a:lnSpc>
-                <a:spcPts val="800"/>
-              </a:lnSpc>
-            </a:pPr>
-            <a:endParaRPr lang="de-DE" altLang="de-DE" sz="1200" kern="0" dirty="0"/>
-          </a:p>
-          <a:p>
-            <a:pPr>
-              <a:lnSpc>
-                <a:spcPts val="800"/>
-              </a:lnSpc>
-            </a:pPr>
-            <a:r>
-              <a:rPr lang="de-DE" altLang="de-DE" sz="1200" kern="0" dirty="0" smtClean="0"/>
-              <a:t>C</a:t>
-            </a:r>
-            <a:r>
-              <a:rPr lang="de-DE" altLang="de-DE" sz="1200" kern="0" dirty="0" smtClean="0"/>
-              <a:t>lick </a:t>
-            </a:r>
-            <a:r>
-              <a:rPr lang="de-DE" altLang="de-DE" sz="1200" kern="0" dirty="0" err="1"/>
-              <a:t>b</a:t>
-            </a:r>
-            <a:r>
-              <a:rPr lang="de-DE" altLang="de-DE" sz="1200" kern="0" dirty="0" err="1" smtClean="0"/>
-              <a:t>utton</a:t>
-            </a:r>
-            <a:r>
-              <a:rPr lang="de-DE" altLang="de-DE" sz="1200" kern="0" dirty="0" smtClean="0"/>
-              <a:t> </a:t>
-            </a:r>
-            <a:r>
-              <a:rPr lang="de-DE" altLang="de-DE" sz="1200" kern="0" dirty="0"/>
-              <a:t>“OK“.</a:t>
-            </a:r>
-          </a:p>
-          <a:p>
-            <a:pPr>
-              <a:lnSpc>
-                <a:spcPts val="800"/>
-              </a:lnSpc>
-            </a:pPr>
-            <a:endParaRPr lang="de-DE" altLang="de-DE" sz="1200" kern="0" dirty="0"/>
-          </a:p>
-          <a:p>
-            <a:pPr>
-              <a:lnSpc>
-                <a:spcPts val="800"/>
-              </a:lnSpc>
-            </a:pPr>
-            <a:endParaRPr lang="de-DE" altLang="de-DE" sz="1200" kern="0" dirty="0"/>
           </a:p>
         </p:txBody>
       </p:sp>

</xml_diff>